<commit_message>
Update Micropython Pico SIG presentation 0 1.pptx
</commit_message>
<xml_diff>
--- a/Micropython Pico SIG presentation 0 1.pptx
+++ b/Micropython Pico SIG presentation 0 1.pptx
@@ -12970,7 +12970,7 @@
                 <a:latin typeface="Kannada MN" pitchFamily="2" charset="0"/>
                 <a:cs typeface="Kannada MN" pitchFamily="2" charset="0"/>
               </a:rPr>
-              <a:t>Possibilities</a:t>
+              <a:t>Sequencing &amp; waypoints </a:t>
             </a:r>
           </a:p>
           <a:p>
@@ -12979,7 +12979,7 @@
                 <a:latin typeface="Kannada MN" pitchFamily="2" charset="0"/>
                 <a:cs typeface="Kannada MN" pitchFamily="2" charset="0"/>
               </a:rPr>
-              <a:t>Train movements</a:t>
+              <a:t>Multiple concurrent train movements</a:t>
             </a:r>
           </a:p>
           <a:p>
@@ -12988,7 +12988,7 @@
                 <a:latin typeface="Kannada MN" pitchFamily="2" charset="0"/>
                 <a:cs typeface="Kannada MN" pitchFamily="2" charset="0"/>
               </a:rPr>
-              <a:t>Sequencing and multiple concurrent train movements</a:t>
+              <a:t>Limitations &amp; dependencies</a:t>
             </a:r>
           </a:p>
           <a:p>
@@ -13008,21 +13008,6 @@
               </a:rPr>
               <a:t>A CBUS module that can run arbitrary user programs</a:t>
             </a:r>
-          </a:p>
-          <a:p>
-            <a:r>
-              <a:rPr lang="en-US" sz="2000" dirty="0">
-                <a:latin typeface="Kannada MN" pitchFamily="2" charset="0"/>
-                <a:cs typeface="Kannada MN" pitchFamily="2" charset="0"/>
-              </a:rPr>
-              <a:t>Limitations</a:t>
-            </a:r>
-          </a:p>
-          <a:p>
-            <a:endParaRPr lang="en-US" sz="2000" dirty="0">
-              <a:latin typeface="Kannada MN" pitchFamily="2" charset="0"/>
-              <a:cs typeface="Kannada MN" pitchFamily="2" charset="0"/>
-            </a:endParaRPr>
           </a:p>
         </p:txBody>
       </p:sp>
@@ -13173,7 +13158,7 @@
                 <a:latin typeface="Kannada MN" pitchFamily="2" charset="0"/>
                 <a:cs typeface="Kannada MN" pitchFamily="2" charset="0"/>
               </a:rPr>
-              <a:t>MR uses other than CBUS ?</a:t>
+              <a:t>Other LCBs ?</a:t>
             </a:r>
           </a:p>
           <a:p>
@@ -13193,6 +13178,16 @@
                 <a:cs typeface="Kannada MN" pitchFamily="2" charset="0"/>
               </a:rPr>
               <a:t>Servos, displays, other MERG modules, etc.</a:t>
+            </a:r>
+          </a:p>
+          <a:p>
+            <a:pPr lvl="1"/>
+            <a:r>
+              <a:rPr lang="en-US" dirty="0">
+                <a:latin typeface="Kannada MN" pitchFamily="2" charset="0"/>
+                <a:cs typeface="Kannada MN" pitchFamily="2" charset="0"/>
+              </a:rPr>
+              <a:t>SPI, I2C, UART, GPIO, ADC, PWM</a:t>
             </a:r>
           </a:p>
           <a:p>
@@ -13972,19 +13967,8 @@
                 <a:latin typeface="Kannada MN" pitchFamily="2" charset="0"/>
                 <a:cs typeface="Kannada MN" pitchFamily="2" charset="0"/>
               </a:rPr>
-              <a:t>Teenage electronics hobbyist &amp; </a:t>
-            </a:r>
-            <a:r>
-              <a:rPr lang="en-US" sz="2000" dirty="0" err="1">
-                <a:latin typeface="Kannada MN" pitchFamily="2" charset="0"/>
-                <a:cs typeface="Kannada MN" pitchFamily="2" charset="0"/>
-              </a:rPr>
-              <a:t>modeller</a:t>
-            </a:r>
-            <a:endParaRPr lang="en-US" sz="2000" dirty="0">
-              <a:latin typeface="Kannada MN" pitchFamily="2" charset="0"/>
-              <a:cs typeface="Kannada MN" pitchFamily="2" charset="0"/>
-            </a:endParaRPr>
+              <a:t>Teenage electronics hobbyist &amp; modeller</a:t>
+            </a:r>
           </a:p>
           <a:p>
             <a:r>
@@ -17642,7 +17626,7 @@
           <a:lstStyle/>
           <a:p>
             <a:r>
-              <a:rPr lang="en-US" sz="2800">
+              <a:rPr lang="en-US" sz="2800" dirty="0">
                 <a:solidFill>
                   <a:srgbClr val="FFFFFF"/>
                 </a:solidFill>
@@ -17928,8 +17912,8 @@
         </p:nvSpPr>
         <p:spPr>
           <a:xfrm>
-            <a:off x="1141412" y="2249487"/>
-            <a:ext cx="9905999" cy="3541714"/>
+            <a:off x="1141413" y="2249487"/>
+            <a:ext cx="5030788" cy="3541714"/>
           </a:xfrm>
         </p:spPr>
         <p:txBody>
@@ -18014,6 +17998,66 @@
           </a:p>
         </p:txBody>
       </p:sp>
+      <p:pic>
+        <p:nvPicPr>
+          <p:cNvPr id="7" name="Picture 6" descr="A picture containing text, clipart&#10;&#10;Description automatically generated">
+            <a:extLst>
+              <a:ext uri="{FF2B5EF4-FFF2-40B4-BE49-F238E27FC236}">
+                <a16:creationId xmlns:a16="http://schemas.microsoft.com/office/drawing/2014/main" id="{ABBF5575-CF26-69E6-C418-F55811F7932B}"/>
+              </a:ext>
+            </a:extLst>
+          </p:cNvPr>
+          <p:cNvPicPr>
+            <a:picLocks noChangeAspect="1"/>
+          </p:cNvPicPr>
+          <p:nvPr/>
+        </p:nvPicPr>
+        <p:blipFill>
+          <a:blip r:embed="rId2"/>
+          <a:stretch>
+            <a:fillRect/>
+          </a:stretch>
+        </p:blipFill>
+        <p:spPr>
+          <a:xfrm>
+            <a:off x="6903830" y="3700668"/>
+            <a:ext cx="2041388" cy="2041388"/>
+          </a:xfrm>
+          <a:prstGeom prst="rect">
+            <a:avLst/>
+          </a:prstGeom>
+        </p:spPr>
+      </p:pic>
+      <p:pic>
+        <p:nvPicPr>
+          <p:cNvPr id="9" name="Picture 8" descr="A screenshot of a video game&#10;&#10;Description automatically generated with medium confidence">
+            <a:extLst>
+              <a:ext uri="{FF2B5EF4-FFF2-40B4-BE49-F238E27FC236}">
+                <a16:creationId xmlns:a16="http://schemas.microsoft.com/office/drawing/2014/main" id="{0DDF49C7-9970-9615-ADDF-F37D5D7AD63F}"/>
+              </a:ext>
+            </a:extLst>
+          </p:cNvPr>
+          <p:cNvPicPr>
+            <a:picLocks noChangeAspect="1"/>
+          </p:cNvPicPr>
+          <p:nvPr/>
+        </p:nvPicPr>
+        <p:blipFill>
+          <a:blip r:embed="rId3"/>
+          <a:stretch>
+            <a:fillRect/>
+          </a:stretch>
+        </p:blipFill>
+        <p:spPr>
+          <a:xfrm>
+            <a:off x="5303078" y="1669842"/>
+            <a:ext cx="6221411" cy="1759158"/>
+          </a:xfrm>
+          <a:prstGeom prst="rect">
+            <a:avLst/>
+          </a:prstGeom>
+        </p:spPr>
+      </p:pic>
     </p:spTree>
     <p:extLst>
       <p:ext uri="{BB962C8B-B14F-4D97-AF65-F5344CB8AC3E}">
@@ -18083,7 +18127,7 @@
           <a:lstStyle/>
           <a:p>
             <a:r>
-              <a:rPr lang="en-US">
+              <a:rPr lang="en-US" dirty="0">
                 <a:latin typeface="Kannada MN" pitchFamily="2" charset="0"/>
                 <a:cs typeface="Kannada MN" pitchFamily="2" charset="0"/>
               </a:rPr>
@@ -18134,7 +18178,7 @@
                 <a:latin typeface="Kannada MN" pitchFamily="2" charset="0"/>
                 <a:cs typeface="Kannada MN" pitchFamily="2" charset="0"/>
               </a:rPr>
-              <a:t>Limitations</a:t>
+              <a:t>Opportunities</a:t>
             </a:r>
           </a:p>
           <a:p>
@@ -18143,17 +18187,16 @@
                 <a:latin typeface="Kannada MN" pitchFamily="2" charset="0"/>
                 <a:cs typeface="Kannada MN" pitchFamily="2" charset="0"/>
               </a:rPr>
-              <a:t>What’s possible and how</a:t>
-            </a:r>
-          </a:p>
-          <a:p>
-            <a:pPr lvl="1"/>
-            <a:r>
-              <a:rPr lang="en-US" sz="1600" dirty="0">
+              <a:t>Limitations</a:t>
+            </a:r>
+          </a:p>
+          <a:p>
+            <a:r>
+              <a:rPr lang="en-US" sz="2000" dirty="0">
                 <a:latin typeface="Kannada MN" pitchFamily="2" charset="0"/>
                 <a:cs typeface="Kannada MN" pitchFamily="2" charset="0"/>
               </a:rPr>
-              <a:t>both Pico cores can be used but … it’s complicated</a:t>
+              <a:t>What’s possible</a:t>
             </a:r>
           </a:p>
         </p:txBody>
@@ -18495,18 +18538,6 @@
               </a:rPr>
               <a:t>Usefulness will (I hope) become clear later !</a:t>
             </a:r>
-          </a:p>
-          <a:p>
-            <a:endParaRPr lang="en-US" sz="2000" dirty="0">
-              <a:latin typeface="Kannada MN" pitchFamily="2" charset="0"/>
-              <a:cs typeface="Kannada MN" pitchFamily="2" charset="0"/>
-            </a:endParaRPr>
-          </a:p>
-          <a:p>
-            <a:endParaRPr lang="en-US" sz="2000" dirty="0">
-              <a:latin typeface="Kannada MN" pitchFamily="2" charset="0"/>
-              <a:cs typeface="Kannada MN" pitchFamily="2" charset="0"/>
-            </a:endParaRPr>
           </a:p>
         </p:txBody>
       </p:sp>

</xml_diff>